<commit_message>
Cap nhat 1 so thu lat vat
</commit_message>
<xml_diff>
--- a/Bao cao do an.pptx
+++ b/Bao cao do an.pptx
@@ -183,7 +183,7 @@
       </p14:sectionLst>
     </p:ext>
     <p:ext uri="{EFAFB233-063F-42B5-8137-9DF3F51BA10A}">
-      <p15:sldGuideLst xmlns="" xmlns:p15="http://schemas.microsoft.com/office/powerpoint/2012/main"/>
+      <p15:sldGuideLst xmlns:p15="http://schemas.microsoft.com/office/powerpoint/2012/main" xmlns=""/>
     </p:ext>
   </p:extLst>
 </p:presentation>
@@ -18427,46 +18427,310 @@
           <a:lstStyle/>
           <a:p>
             <a:r>
-              <a:rPr lang="en-US" smtClean="0"/>
-              <a:t>Giao diện tab cơ bản</a:t>
-            </a:r>
-          </a:p>
-          <a:p>
-            <a:r>
-              <a:rPr lang="en-US" smtClean="0"/>
-              <a:t>Hỗ trợ ngôn ngữ C, C++, C#, VB</a:t>
-            </a:r>
-          </a:p>
-          <a:p>
-            <a:r>
-              <a:rPr lang="en-US" smtClean="0"/>
-              <a:t>Syntax highlight với từ khóa cố định</a:t>
-            </a:r>
-          </a:p>
-          <a:p>
-            <a:r>
-              <a:rPr lang="en-US" smtClean="0"/>
-              <a:t>Auto complete với từ khóa cố định</a:t>
-            </a:r>
-          </a:p>
-          <a:p>
-            <a:r>
-              <a:rPr lang="en-US" smtClean="0"/>
-              <a:t>Code folding hoạt động với mức độ cơ bản</a:t>
-            </a:r>
-          </a:p>
-          <a:p>
-            <a:r>
-              <a:rPr lang="en-US" smtClean="0"/>
-              <a:t>Document map hoạt động tốt</a:t>
-            </a:r>
-          </a:p>
-          <a:p>
-            <a:r>
-              <a:rPr lang="en-US" smtClean="0"/>
-              <a:t>Bookmark margin với Number margin hoạt động tốt</a:t>
-            </a:r>
-            <a:endParaRPr lang="en-US"/>
+              <a:rPr lang="en-US" dirty="0" err="1" smtClean="0"/>
+              <a:t>Giao</a:t>
+            </a:r>
+            <a:r>
+              <a:rPr lang="en-US" dirty="0" smtClean="0"/>
+              <a:t> </a:t>
+            </a:r>
+            <a:r>
+              <a:rPr lang="en-US" dirty="0" err="1" smtClean="0"/>
+              <a:t>diện</a:t>
+            </a:r>
+            <a:r>
+              <a:rPr lang="en-US" dirty="0" smtClean="0"/>
+              <a:t> tab </a:t>
+            </a:r>
+            <a:r>
+              <a:rPr lang="en-US" dirty="0" err="1" smtClean="0"/>
+              <a:t>cơ</a:t>
+            </a:r>
+            <a:r>
+              <a:rPr lang="en-US" dirty="0" smtClean="0"/>
+              <a:t> </a:t>
+            </a:r>
+            <a:r>
+              <a:rPr lang="en-US" dirty="0" err="1" smtClean="0"/>
+              <a:t>bản</a:t>
+            </a:r>
+            <a:endParaRPr lang="en-US" dirty="0" smtClean="0"/>
+          </a:p>
+          <a:p>
+            <a:r>
+              <a:rPr lang="en-US" dirty="0" err="1" smtClean="0"/>
+              <a:t>Hỗ</a:t>
+            </a:r>
+            <a:r>
+              <a:rPr lang="en-US" dirty="0" smtClean="0"/>
+              <a:t> </a:t>
+            </a:r>
+            <a:r>
+              <a:rPr lang="en-US" dirty="0" err="1" smtClean="0"/>
+              <a:t>trợ</a:t>
+            </a:r>
+            <a:r>
+              <a:rPr lang="en-US" dirty="0" smtClean="0"/>
+              <a:t> </a:t>
+            </a:r>
+            <a:r>
+              <a:rPr lang="en-US" dirty="0" err="1" smtClean="0"/>
+              <a:t>ngôn</a:t>
+            </a:r>
+            <a:r>
+              <a:rPr lang="en-US" dirty="0" smtClean="0"/>
+              <a:t> </a:t>
+            </a:r>
+            <a:r>
+              <a:rPr lang="en-US" dirty="0" err="1" smtClean="0"/>
+              <a:t>ngữ</a:t>
+            </a:r>
+            <a:r>
+              <a:rPr lang="en-US" dirty="0" smtClean="0"/>
+              <a:t> C, C++, C#, VB</a:t>
+            </a:r>
+          </a:p>
+          <a:p>
+            <a:r>
+              <a:rPr lang="en-US" dirty="0" smtClean="0"/>
+              <a:t>Syntax highlight </a:t>
+            </a:r>
+            <a:r>
+              <a:rPr lang="en-US" dirty="0" err="1" smtClean="0"/>
+              <a:t>với</a:t>
+            </a:r>
+            <a:r>
+              <a:rPr lang="en-US" dirty="0" smtClean="0"/>
+              <a:t> </a:t>
+            </a:r>
+            <a:r>
+              <a:rPr lang="en-US" dirty="0" err="1" smtClean="0"/>
+              <a:t>từ</a:t>
+            </a:r>
+            <a:r>
+              <a:rPr lang="en-US" dirty="0" smtClean="0"/>
+              <a:t> </a:t>
+            </a:r>
+            <a:r>
+              <a:rPr lang="en-US" dirty="0" err="1" smtClean="0"/>
+              <a:t>khóa</a:t>
+            </a:r>
+            <a:r>
+              <a:rPr lang="en-US" dirty="0" smtClean="0"/>
+              <a:t> </a:t>
+            </a:r>
+            <a:r>
+              <a:rPr lang="en-US" dirty="0" err="1" smtClean="0"/>
+              <a:t>cố</a:t>
+            </a:r>
+            <a:r>
+              <a:rPr lang="en-US" dirty="0" smtClean="0"/>
+              <a:t> </a:t>
+            </a:r>
+            <a:r>
+              <a:rPr lang="en-US" dirty="0" err="1" smtClean="0"/>
+              <a:t>định</a:t>
+            </a:r>
+            <a:endParaRPr lang="en-US" dirty="0" smtClean="0"/>
+          </a:p>
+          <a:p>
+            <a:r>
+              <a:rPr lang="en-US" dirty="0" smtClean="0"/>
+              <a:t>Auto complete </a:t>
+            </a:r>
+            <a:r>
+              <a:rPr lang="en-US" dirty="0" err="1" smtClean="0"/>
+              <a:t>với</a:t>
+            </a:r>
+            <a:r>
+              <a:rPr lang="en-US" dirty="0" smtClean="0"/>
+              <a:t> </a:t>
+            </a:r>
+            <a:r>
+              <a:rPr lang="en-US" dirty="0" err="1" smtClean="0"/>
+              <a:t>từ</a:t>
+            </a:r>
+            <a:r>
+              <a:rPr lang="en-US" dirty="0" smtClean="0"/>
+              <a:t> </a:t>
+            </a:r>
+            <a:r>
+              <a:rPr lang="en-US" dirty="0" err="1" smtClean="0"/>
+              <a:t>khóa</a:t>
+            </a:r>
+            <a:r>
+              <a:rPr lang="en-US" dirty="0" smtClean="0"/>
+              <a:t> </a:t>
+            </a:r>
+            <a:r>
+              <a:rPr lang="en-US" dirty="0" err="1" smtClean="0"/>
+              <a:t>cố</a:t>
+            </a:r>
+            <a:r>
+              <a:rPr lang="en-US" dirty="0" smtClean="0"/>
+              <a:t> </a:t>
+            </a:r>
+            <a:r>
+              <a:rPr lang="en-US" dirty="0" err="1" smtClean="0"/>
+              <a:t>định</a:t>
+            </a:r>
+            <a:endParaRPr lang="en-US" dirty="0" smtClean="0"/>
+          </a:p>
+          <a:p>
+            <a:r>
+              <a:rPr lang="en-US" dirty="0" smtClean="0"/>
+              <a:t>Code folding </a:t>
+            </a:r>
+            <a:r>
+              <a:rPr lang="en-US" dirty="0" err="1" smtClean="0"/>
+              <a:t>hoạt</a:t>
+            </a:r>
+            <a:r>
+              <a:rPr lang="en-US" dirty="0" smtClean="0"/>
+              <a:t> </a:t>
+            </a:r>
+            <a:r>
+              <a:rPr lang="en-US" dirty="0" err="1" smtClean="0"/>
+              <a:t>động</a:t>
+            </a:r>
+            <a:r>
+              <a:rPr lang="en-US" dirty="0" smtClean="0"/>
+              <a:t> </a:t>
+            </a:r>
+            <a:r>
+              <a:rPr lang="en-US" dirty="0" err="1" smtClean="0"/>
+              <a:t>với</a:t>
+            </a:r>
+            <a:r>
+              <a:rPr lang="en-US" dirty="0" smtClean="0"/>
+              <a:t> </a:t>
+            </a:r>
+            <a:r>
+              <a:rPr lang="en-US" dirty="0" err="1" smtClean="0"/>
+              <a:t>mức</a:t>
+            </a:r>
+            <a:r>
+              <a:rPr lang="en-US" dirty="0" smtClean="0"/>
+              <a:t> </a:t>
+            </a:r>
+            <a:r>
+              <a:rPr lang="en-US" dirty="0" err="1" smtClean="0"/>
+              <a:t>độ</a:t>
+            </a:r>
+            <a:r>
+              <a:rPr lang="en-US" dirty="0" smtClean="0"/>
+              <a:t> </a:t>
+            </a:r>
+            <a:r>
+              <a:rPr lang="en-US" dirty="0" err="1" smtClean="0"/>
+              <a:t>cơ</a:t>
+            </a:r>
+            <a:r>
+              <a:rPr lang="en-US" dirty="0" smtClean="0"/>
+              <a:t> </a:t>
+            </a:r>
+            <a:r>
+              <a:rPr lang="en-US" dirty="0" err="1" smtClean="0"/>
+              <a:t>bản</a:t>
+            </a:r>
+            <a:endParaRPr lang="en-US" dirty="0" smtClean="0"/>
+          </a:p>
+          <a:p>
+            <a:r>
+              <a:rPr lang="en-US" dirty="0" smtClean="0"/>
+              <a:t>Document map </a:t>
+            </a:r>
+            <a:r>
+              <a:rPr lang="en-US" dirty="0" err="1" smtClean="0"/>
+              <a:t>hoạt</a:t>
+            </a:r>
+            <a:r>
+              <a:rPr lang="en-US" dirty="0" smtClean="0"/>
+              <a:t> </a:t>
+            </a:r>
+            <a:r>
+              <a:rPr lang="en-US" dirty="0" err="1" smtClean="0"/>
+              <a:t>động</a:t>
+            </a:r>
+            <a:r>
+              <a:rPr lang="en-US" dirty="0" smtClean="0"/>
+              <a:t> </a:t>
+            </a:r>
+            <a:r>
+              <a:rPr lang="en-US" dirty="0" err="1" smtClean="0"/>
+              <a:t>tốt</a:t>
+            </a:r>
+            <a:endParaRPr lang="en-US" dirty="0" smtClean="0"/>
+          </a:p>
+          <a:p>
+            <a:r>
+              <a:rPr lang="en-US" dirty="0" smtClean="0"/>
+              <a:t>Bookmark margin </a:t>
+            </a:r>
+            <a:r>
+              <a:rPr lang="en-US" dirty="0" err="1" smtClean="0"/>
+              <a:t>với</a:t>
+            </a:r>
+            <a:r>
+              <a:rPr lang="en-US" dirty="0" smtClean="0"/>
+              <a:t> Number margin </a:t>
+            </a:r>
+            <a:r>
+              <a:rPr lang="en-US" dirty="0" err="1" smtClean="0"/>
+              <a:t>hoạt</a:t>
+            </a:r>
+            <a:r>
+              <a:rPr lang="en-US" dirty="0" smtClean="0"/>
+              <a:t> </a:t>
+            </a:r>
+            <a:r>
+              <a:rPr lang="en-US" dirty="0" err="1" smtClean="0"/>
+              <a:t>động</a:t>
+            </a:r>
+            <a:r>
+              <a:rPr lang="en-US" dirty="0" smtClean="0"/>
+              <a:t> </a:t>
+            </a:r>
+            <a:r>
+              <a:rPr lang="en-US" dirty="0" err="1" smtClean="0"/>
+              <a:t>tốt</a:t>
+            </a:r>
+            <a:endParaRPr lang="en-US" dirty="0" smtClean="0"/>
+          </a:p>
+          <a:p>
+            <a:r>
+              <a:rPr lang="en-US" dirty="0"/>
+              <a:t>Auto Indenting </a:t>
+            </a:r>
+            <a:r>
+              <a:rPr lang="en-US" dirty="0" err="1"/>
+              <a:t>và</a:t>
+            </a:r>
+            <a:r>
+              <a:rPr lang="en-US" dirty="0"/>
+              <a:t> Brace Matching </a:t>
+            </a:r>
+            <a:r>
+              <a:rPr lang="en-US" dirty="0" err="1"/>
+              <a:t>chạy</a:t>
+            </a:r>
+            <a:r>
+              <a:rPr lang="en-US" dirty="0"/>
+              <a:t> </a:t>
+            </a:r>
+            <a:r>
+              <a:rPr lang="en-US" dirty="0" err="1"/>
+              <a:t>hiệu</a:t>
+            </a:r>
+            <a:r>
+              <a:rPr lang="en-US" dirty="0"/>
+              <a:t> </a:t>
+            </a:r>
+            <a:r>
+              <a:rPr lang="en-US" smtClean="0"/>
+              <a:t>quả</a:t>
+            </a:r>
+            <a:endParaRPr lang="en-US" dirty="0"/>
           </a:p>
         </p:txBody>
       </p:sp>
@@ -21004,7 +21268,7 @@
   <a:extraClrSchemeLst/>
   <a:extLst>
     <a:ext uri="{05A4C25C-085E-4340-85A3-A5531E510DB2}">
-      <thm15:themeFamily xmlns="" xmlns:thm15="http://schemas.microsoft.com/office/thememl/2012/main" name="Metropolitan" id="{4C5440D6-04D2-4954-96CF-F251137069B2}" vid="{3A8A2BB7-7C5E-4EB2-B1F1-CFFF0F57E773}"/>
+      <thm15:themeFamily xmlns:thm15="http://schemas.microsoft.com/office/thememl/2012/main" xmlns="" name="Metropolitan" id="{4C5440D6-04D2-4954-96CF-F251137069B2}" vid="{3A8A2BB7-7C5E-4EB2-B1F1-CFFF0F57E773}"/>
     </a:ext>
   </a:extLst>
 </a:theme>
@@ -21241,7 +21505,7 @@
   <a:extraClrSchemeLst/>
   <a:extLst>
     <a:ext uri="{05A4C25C-085E-4340-85A3-A5531E510DB2}">
-      <thm15:themeFamily xmlns="" xmlns:thm15="http://schemas.microsoft.com/office/thememl/2012/main" name="Metropolitan" id="{4C5440D6-04D2-4954-96CF-F251137069B2}" vid="{33ACF124-275F-44F2-8DE0-0A755069829B}"/>
+      <thm15:themeFamily xmlns:thm15="http://schemas.microsoft.com/office/thememl/2012/main" xmlns="" name="Metropolitan" id="{4C5440D6-04D2-4954-96CF-F251137069B2}" vid="{33ACF124-275F-44F2-8DE0-0A755069829B}"/>
     </a:ext>
   </a:extLst>
 </a:theme>
@@ -21478,7 +21742,7 @@
   <a:extraClrSchemeLst/>
   <a:extLst>
     <a:ext uri="{05A4C25C-085E-4340-85A3-A5531E510DB2}">
-      <thm15:themeFamily xmlns="" xmlns:thm15="http://schemas.microsoft.com/office/thememl/2012/main" name="Metropolitan" id="{4C5440D6-04D2-4954-96CF-F251137069B2}" vid="{0941A018-FB9B-4401-A32C-7E04526866E0}"/>
+      <thm15:themeFamily xmlns:thm15="http://schemas.microsoft.com/office/thememl/2012/main" xmlns="" name="Metropolitan" id="{4C5440D6-04D2-4954-96CF-F251137069B2}" vid="{0941A018-FB9B-4401-A32C-7E04526866E0}"/>
     </a:ext>
   </a:extLst>
 </a:theme>
@@ -21715,7 +21979,7 @@
   <a:extraClrSchemeLst/>
   <a:extLst>
     <a:ext uri="{05A4C25C-085E-4340-85A3-A5531E510DB2}">
-      <thm15:themeFamily xmlns="" xmlns:thm15="http://schemas.microsoft.com/office/thememl/2012/main" name="Metropolitan" id="{4C5440D6-04D2-4954-96CF-F251137069B2}" vid="{79CFCA13-9412-4290-BB4B-85112F88857B}"/>
+      <thm15:themeFamily xmlns:thm15="http://schemas.microsoft.com/office/thememl/2012/main" xmlns="" name="Metropolitan" id="{4C5440D6-04D2-4954-96CF-F251137069B2}" vid="{79CFCA13-9412-4290-BB4B-85112F88857B}"/>
     </a:ext>
   </a:extLst>
 </a:theme>
@@ -21976,28 +22240,13 @@
   <a:extraClrSchemeLst/>
   <a:extLst>
     <a:ext uri="{05A4C25C-085E-4340-85A3-A5531E510DB2}">
-      <thm15:themeFamily xmlns="" xmlns:thm15="http://schemas.microsoft.com/office/thememl/2012/main" name="Office Theme" id="{62F939B6-93AF-4DB8-9C6B-D6C7DFDC589F}" vid="{4A3C46E8-61CC-4603-A589-7422A47A8E4A}"/>
+      <thm15:themeFamily xmlns:thm15="http://schemas.microsoft.com/office/thememl/2012/main" xmlns="" name="Office Theme" id="{62F939B6-93AF-4DB8-9C6B-D6C7DFDC589F}" vid="{4A3C46E8-61CC-4603-A589-7422A47A8E4A}"/>
     </a:ext>
   </a:extLst>
 </a:theme>
 </file>
 
 <file path=customXml/item1.xml><?xml version="1.0" encoding="utf-8"?>
-<?mso-contentType ?>
-<FormTemplates xmlns="http://schemas.microsoft.com/sharepoint/v3/contenttype/forms">
-  <Display>DocumentLibraryForm</Display>
-  <Edit>DocumentLibraryForm</Edit>
-  <New>DocumentLibraryForm</New>
-</FormTemplates>
-</file>
-
-<file path=customXml/item2.xml><?xml version="1.0" encoding="utf-8"?>
-<p:properties xmlns:p="http://schemas.microsoft.com/office/2006/metadata/properties" xmlns:xsi="http://www.w3.org/2001/XMLSchema-instance" xmlns:pc="http://schemas.microsoft.com/office/infopath/2007/PartnerControls">
-  <documentManagement/>
-</p:properties>
-</file>
-
-<file path=customXml/item3.xml><?xml version="1.0" encoding="utf-8"?>
 <ct:contentTypeSchema xmlns:ct="http://schemas.microsoft.com/office/2006/metadata/contentType" xmlns:ma="http://schemas.microsoft.com/office/2006/metadata/properties/metaAttributes" ct:_="" ma:_="" ma:contentTypeName="Document" ma:contentTypeID="0x0101007C1D5F340F01F94FA2FD29A5E6DC872E" ma:contentTypeVersion="0" ma:contentTypeDescription="Create a new document." ma:contentTypeScope="" ma:versionID="f583bd66513a361a730282b6a794e352">
   <xsd:schema xmlns:xsd="http://www.w3.org/2001/XMLSchema" xmlns:xs="http://www.w3.org/2001/XMLSchema" xmlns:p="http://schemas.microsoft.com/office/2006/metadata/properties" targetNamespace="http://schemas.microsoft.com/office/2006/metadata/properties" ma:root="true" ma:fieldsID="6841151cf538834e171094e4faaf2d73">
     <xsd:element name="properties">
@@ -22111,10 +22360,33 @@
 </ct:contentTypeSchema>
 </file>
 
+<file path=customXml/item2.xml><?xml version="1.0" encoding="utf-8"?>
+<p:properties xmlns:p="http://schemas.microsoft.com/office/2006/metadata/properties" xmlns:xsi="http://www.w3.org/2001/XMLSchema-instance" xmlns:pc="http://schemas.microsoft.com/office/infopath/2007/PartnerControls">
+  <documentManagement/>
+</p:properties>
+</file>
+
+<file path=customXml/item3.xml><?xml version="1.0" encoding="utf-8"?>
+<?mso-contentType ?>
+<FormTemplates xmlns="http://schemas.microsoft.com/sharepoint/v3/contenttype/forms">
+  <Display>DocumentLibraryForm</Display>
+  <Edit>DocumentLibraryForm</Edit>
+  <New>DocumentLibraryForm</New>
+</FormTemplates>
+</file>
+
 <file path=customXml/itemProps1.xml><?xml version="1.0" encoding="utf-8"?>
-<ds:datastoreItem xmlns:ds="http://schemas.openxmlformats.org/officeDocument/2006/customXml" ds:itemID="{76B64549-C1F2-49EA-8B2D-5EF61BF1CE56}">
+<ds:datastoreItem xmlns:ds="http://schemas.openxmlformats.org/officeDocument/2006/customXml" ds:itemID="{29F17D79-05FE-43C7-A9B5-360E9D6B5ACC}">
   <ds:schemaRefs>
-    <ds:schemaRef ds:uri="http://schemas.microsoft.com/sharepoint/v3/contenttype/forms"/>
+    <ds:schemaRef ds:uri="http://schemas.microsoft.com/office/2006/metadata/contentType"/>
+    <ds:schemaRef ds:uri="http://schemas.microsoft.com/office/2006/metadata/properties/metaAttributes"/>
+    <ds:schemaRef ds:uri="http://www.w3.org/2001/XMLSchema"/>
+    <ds:schemaRef ds:uri="http://schemas.microsoft.com/office/2006/metadata/properties"/>
+    <ds:schemaRef ds:uri="http://schemas.openxmlformats.org/package/2006/metadata/core-properties"/>
+    <ds:schemaRef ds:uri="http://purl.org/dc/elements/1.1/"/>
+    <ds:schemaRef ds:uri="http://purl.org/dc/terms/"/>
+    <ds:schemaRef ds:uri="http://schemas.microsoft.com/internal/obd"/>
+    <ds:schemaRef ds:uri="http://schemas.microsoft.com/office/infopath/2007/PartnerControls"/>
   </ds:schemaRefs>
 </ds:datastoreItem>
 </file>
@@ -22135,17 +22407,9 @@
 </file>
 
 <file path=customXml/itemProps3.xml><?xml version="1.0" encoding="utf-8"?>
-<ds:datastoreItem xmlns:ds="http://schemas.openxmlformats.org/officeDocument/2006/customXml" ds:itemID="{29F17D79-05FE-43C7-A9B5-360E9D6B5ACC}">
+<ds:datastoreItem xmlns:ds="http://schemas.openxmlformats.org/officeDocument/2006/customXml" ds:itemID="{76B64549-C1F2-49EA-8B2D-5EF61BF1CE56}">
   <ds:schemaRefs>
-    <ds:schemaRef ds:uri="http://schemas.microsoft.com/office/2006/metadata/contentType"/>
-    <ds:schemaRef ds:uri="http://schemas.microsoft.com/office/2006/metadata/properties/metaAttributes"/>
-    <ds:schemaRef ds:uri="http://www.w3.org/2001/XMLSchema"/>
-    <ds:schemaRef ds:uri="http://schemas.microsoft.com/office/2006/metadata/properties"/>
-    <ds:schemaRef ds:uri="http://schemas.openxmlformats.org/package/2006/metadata/core-properties"/>
-    <ds:schemaRef ds:uri="http://purl.org/dc/elements/1.1/"/>
-    <ds:schemaRef ds:uri="http://purl.org/dc/terms/"/>
-    <ds:schemaRef ds:uri="http://schemas.microsoft.com/internal/obd"/>
-    <ds:schemaRef ds:uri="http://schemas.microsoft.com/office/infopath/2007/PartnerControls"/>
+    <ds:schemaRef ds:uri="http://schemas.microsoft.com/sharepoint/v3/contenttype/forms"/>
   </ds:schemaRefs>
 </ds:datastoreItem>
 </file>
</xml_diff>